<commit_message>
Mise a jour la presentation
Ceci est pour la presentation finale et ca permet a chaque membre de telechrger la presentation
</commit_message>
<xml_diff>
--- a/SEG 2505 Presentation.pptx
+++ b/SEG 2505 Presentation.pptx
@@ -112,6 +112,11 @@
       </a:defRPr>
     </a:lvl9pPr>
   </p:defaultTextStyle>
+  <p:extLst>
+    <p:ext uri="{EFAFB233-063F-42B5-8137-9DF3F51BA10A}">
+      <p15:sldGuideLst xmlns:p15="http://schemas.microsoft.com/office/powerpoint/2012/main"/>
+    </p:ext>
+  </p:extLst>
 </p:presentation>
 </file>
 
@@ -197,7 +202,7 @@
           <a:p>
             <a:fld id="{31F0B109-C435-BC48-A445-C8CD78535697}" type="datetimeFigureOut">
               <a:rPr lang="fr-CA" smtClean="0"/>
-              <a:t>19-11-24</a:t>
+              <a:t>19-11-26</a:t>
             </a:fld>
             <a:endParaRPr lang="fr-CA"/>
           </a:p>
@@ -604,7 +609,7 @@
           <a:p>
             <a:fld id="{7B72BD9A-E31F-0C42-B0A4-E107C3716742}" type="datetimeFigureOut">
               <a:rPr lang="en-US" smtClean="0"/>
-              <a:t>11/24/19</a:t>
+              <a:t>11/26/19</a:t>
             </a:fld>
             <a:endParaRPr lang="en-US"/>
           </a:p>
@@ -810,7 +815,7 @@
           <a:p>
             <a:fld id="{7B72BD9A-E31F-0C42-B0A4-E107C3716742}" type="datetimeFigureOut">
               <a:rPr lang="en-US" smtClean="0"/>
-              <a:t>11/24/19</a:t>
+              <a:t>11/26/19</a:t>
             </a:fld>
             <a:endParaRPr lang="en-US"/>
           </a:p>
@@ -1020,7 +1025,7 @@
           <a:p>
             <a:fld id="{7B72BD9A-E31F-0C42-B0A4-E107C3716742}" type="datetimeFigureOut">
               <a:rPr lang="en-US" smtClean="0"/>
-              <a:t>11/24/19</a:t>
+              <a:t>11/26/19</a:t>
             </a:fld>
             <a:endParaRPr lang="en-US"/>
           </a:p>
@@ -1129,7 +1134,7 @@
           <p:cNvPr id="2" name="Footer Placeholder 4">
             <a:extLst>
               <a:ext uri="{FF2B5EF4-FFF2-40B4-BE49-F238E27FC236}">
-                <a16:creationId xmlns:a16="http://schemas.microsoft.com/office/drawing/2014/main" xmlns="" id="{FE0B4600-FE96-404A-B73F-81B7A07C97DA}"/>
+                <a16:creationId xmlns="" xmlns:a16="http://schemas.microsoft.com/office/drawing/2014/main" id="{FE0B4600-FE96-404A-B73F-81B7A07C97DA}"/>
               </a:ext>
             </a:extLst>
           </p:cNvPr>
@@ -1164,7 +1169,7 @@
           <p:cNvPr id="3" name="Slide Number Placeholder 5">
             <a:extLst>
               <a:ext uri="{FF2B5EF4-FFF2-40B4-BE49-F238E27FC236}">
-                <a16:creationId xmlns:a16="http://schemas.microsoft.com/office/drawing/2014/main" xmlns="" id="{8B045D73-54B8-43EC-BB26-D49545AB28CC}"/>
+                <a16:creationId xmlns="" xmlns:a16="http://schemas.microsoft.com/office/drawing/2014/main" id="{8B045D73-54B8-43EC-BB26-D49545AB28CC}"/>
               </a:ext>
             </a:extLst>
           </p:cNvPr>
@@ -1236,7 +1241,7 @@
           <p:cNvPr id="2" name="Footer Placeholder 4">
             <a:extLst>
               <a:ext uri="{FF2B5EF4-FFF2-40B4-BE49-F238E27FC236}">
-                <a16:creationId xmlns:a16="http://schemas.microsoft.com/office/drawing/2014/main" xmlns="" id="{3B3C299F-D30B-4B01-B66D-6D655AFCEEB8}"/>
+                <a16:creationId xmlns="" xmlns:a16="http://schemas.microsoft.com/office/drawing/2014/main" id="{3B3C299F-D30B-4B01-B66D-6D655AFCEEB8}"/>
               </a:ext>
             </a:extLst>
           </p:cNvPr>
@@ -1271,7 +1276,7 @@
           <p:cNvPr id="3" name="Slide Number Placeholder 5">
             <a:extLst>
               <a:ext uri="{FF2B5EF4-FFF2-40B4-BE49-F238E27FC236}">
-                <a16:creationId xmlns:a16="http://schemas.microsoft.com/office/drawing/2014/main" xmlns="" id="{9FD2738E-8B79-4145-AA17-9AE878E40085}"/>
+                <a16:creationId xmlns="" xmlns:a16="http://schemas.microsoft.com/office/drawing/2014/main" id="{9FD2738E-8B79-4145-AA17-9AE878E40085}"/>
               </a:ext>
             </a:extLst>
           </p:cNvPr>
@@ -1430,7 +1435,7 @@
           <a:p>
             <a:fld id="{7B72BD9A-E31F-0C42-B0A4-E107C3716742}" type="datetimeFigureOut">
               <a:rPr lang="en-US" smtClean="0"/>
-              <a:t>11/24/19</a:t>
+              <a:t>11/26/19</a:t>
             </a:fld>
             <a:endParaRPr lang="en-US"/>
           </a:p>
@@ -1704,7 +1709,7 @@
           <a:p>
             <a:fld id="{7B72BD9A-E31F-0C42-B0A4-E107C3716742}" type="datetimeFigureOut">
               <a:rPr lang="en-US" smtClean="0"/>
-              <a:t>11/24/19</a:t>
+              <a:t>11/26/19</a:t>
             </a:fld>
             <a:endParaRPr lang="en-US"/>
           </a:p>
@@ -1967,7 +1972,7 @@
           <a:p>
             <a:fld id="{7B72BD9A-E31F-0C42-B0A4-E107C3716742}" type="datetimeFigureOut">
               <a:rPr lang="en-US" smtClean="0"/>
-              <a:t>11/24/19</a:t>
+              <a:t>11/26/19</a:t>
             </a:fld>
             <a:endParaRPr lang="en-US"/>
           </a:p>
@@ -2378,7 +2383,7 @@
           <a:p>
             <a:fld id="{7B72BD9A-E31F-0C42-B0A4-E107C3716742}" type="datetimeFigureOut">
               <a:rPr lang="en-US" smtClean="0"/>
-              <a:t>11/24/19</a:t>
+              <a:t>11/26/19</a:t>
             </a:fld>
             <a:endParaRPr lang="en-US"/>
           </a:p>
@@ -2522,7 +2527,7 @@
           <a:p>
             <a:fld id="{7B72BD9A-E31F-0C42-B0A4-E107C3716742}" type="datetimeFigureOut">
               <a:rPr lang="en-US" smtClean="0"/>
-              <a:t>11/24/19</a:t>
+              <a:t>11/26/19</a:t>
             </a:fld>
             <a:endParaRPr lang="en-US"/>
           </a:p>
@@ -2643,7 +2648,7 @@
           <a:p>
             <a:fld id="{7B72BD9A-E31F-0C42-B0A4-E107C3716742}" type="datetimeFigureOut">
               <a:rPr lang="en-US" smtClean="0"/>
-              <a:t>11/24/19</a:t>
+              <a:t>11/26/19</a:t>
             </a:fld>
             <a:endParaRPr lang="en-US"/>
           </a:p>
@@ -2889,7 +2894,7 @@
           <a:p>
             <a:fld id="{7B72BD9A-E31F-0C42-B0A4-E107C3716742}" type="datetimeFigureOut">
               <a:rPr lang="en-US" smtClean="0"/>
-              <a:t>11/24/19</a:t>
+              <a:t>11/26/19</a:t>
             </a:fld>
             <a:endParaRPr lang="en-US"/>
           </a:p>
@@ -3329,7 +3334,7 @@
           <a:p>
             <a:fld id="{7B72BD9A-E31F-0C42-B0A4-E107C3716742}" type="datetimeFigureOut">
               <a:rPr lang="en-US" smtClean="0"/>
-              <a:t>11/24/19</a:t>
+              <a:t>11/26/19</a:t>
             </a:fld>
             <a:endParaRPr lang="en-US"/>
           </a:p>
@@ -3650,7 +3655,7 @@
           <a:p>
             <a:fld id="{7B72BD9A-E31F-0C42-B0A4-E107C3716742}" type="datetimeFigureOut">
               <a:rPr lang="en-US" smtClean="0"/>
-              <a:t>11/24/19</a:t>
+              <a:t>11/26/19</a:t>
             </a:fld>
             <a:endParaRPr lang="en-US"/>
           </a:p>
@@ -4143,7 +4148,7 @@
           <p:cNvPr id="2" name="TextBox 3">
             <a:extLst>
               <a:ext uri="{FF2B5EF4-FFF2-40B4-BE49-F238E27FC236}">
-                <a16:creationId xmlns:a16="http://schemas.microsoft.com/office/drawing/2014/main" xmlns="" id="{B2F7EF7E-4278-4019-9870-4575EA849C9F}"/>
+                <a16:creationId xmlns="" xmlns:a16="http://schemas.microsoft.com/office/drawing/2014/main" id="{B2F7EF7E-4278-4019-9870-4575EA849C9F}"/>
               </a:ext>
             </a:extLst>
           </p:cNvPr>
@@ -4241,7 +4246,7 @@
           <p:cNvPr id="3" name="TextBox 5">
             <a:extLst>
               <a:ext uri="{FF2B5EF4-FFF2-40B4-BE49-F238E27FC236}">
-                <a16:creationId xmlns:a16="http://schemas.microsoft.com/office/drawing/2014/main" xmlns="" id="{E8195597-E062-4FDC-B48C-C77ABF445E05}"/>
+                <a16:creationId xmlns="" xmlns:a16="http://schemas.microsoft.com/office/drawing/2014/main" id="{E8195597-E062-4FDC-B48C-C77ABF445E05}"/>
               </a:ext>
             </a:extLst>
           </p:cNvPr>
@@ -4349,7 +4354,7 @@
           <p:cNvPr id="4" name="TextBox 4">
             <a:extLst>
               <a:ext uri="{FF2B5EF4-FFF2-40B4-BE49-F238E27FC236}">
-                <a16:creationId xmlns:a16="http://schemas.microsoft.com/office/drawing/2014/main" xmlns="" id="{64824146-55D2-4890-B4E7-49C155A241BC}"/>
+                <a16:creationId xmlns="" xmlns:a16="http://schemas.microsoft.com/office/drawing/2014/main" id="{64824146-55D2-4890-B4E7-49C155A241BC}"/>
               </a:ext>
             </a:extLst>
           </p:cNvPr>
@@ -4762,7 +4767,7 @@
           <p:cNvPr id="5" name="Picture 7" descr="A close up of a sign&#10;&#10;Description generated with very high confidence">
             <a:extLst>
               <a:ext uri="{FF2B5EF4-FFF2-40B4-BE49-F238E27FC236}">
-                <a16:creationId xmlns:a16="http://schemas.microsoft.com/office/drawing/2014/main" xmlns="" id="{A31D30B6-D65B-49BC-89C0-23C4B3BC7B05}"/>
+                <a16:creationId xmlns="" xmlns:a16="http://schemas.microsoft.com/office/drawing/2014/main" id="{A31D30B6-D65B-49BC-89C0-23C4B3BC7B05}"/>
               </a:ext>
             </a:extLst>
           </p:cNvPr>
@@ -4796,7 +4801,7 @@
           <p:cNvPr id="6" name="Parchemin : horizontal 14">
             <a:extLst>
               <a:ext uri="{FF2B5EF4-FFF2-40B4-BE49-F238E27FC236}">
-                <a16:creationId xmlns:a16="http://schemas.microsoft.com/office/drawing/2014/main" xmlns="" id="{EA012110-6A81-4B2A-8301-A7D7B0B7E3F2}"/>
+                <a16:creationId xmlns="" xmlns:a16="http://schemas.microsoft.com/office/drawing/2014/main" id="{EA012110-6A81-4B2A-8301-A7D7B0B7E3F2}"/>
               </a:ext>
             </a:extLst>
           </p:cNvPr>
@@ -5142,15 +5147,37 @@
         </p:nvSpPr>
         <p:spPr>
           <a:xfrm>
-            <a:off x="546118" y="3006726"/>
+            <a:off x="957262" y="2185225"/>
             <a:ext cx="6097570" cy="865187"/>
           </a:xfrm>
         </p:spPr>
         <p:txBody>
-          <a:bodyPr/>
+          <a:bodyPr>
+            <a:noAutofit/>
+          </a:bodyPr>
           <a:lstStyle/>
           <a:p>
-            <a:endParaRPr lang="en-US" dirty="0"/>
+            <a:pPr marL="342900" lvl="0" indent="-342900">
+              <a:buFont typeface="Wingdings" pitchFamily="34"/>
+              <a:buChar char="Ø"/>
+            </a:pPr>
+            <a:r>
+              <a:rPr lang="en-US" sz="2000" dirty="0" err="1" smtClean="0"/>
+              <a:t>C’est</a:t>
+            </a:r>
+            <a:r>
+              <a:rPr lang="en-US" sz="2000" dirty="0" smtClean="0"/>
+              <a:t> quoi la </a:t>
+            </a:r>
+            <a:r>
+              <a:rPr lang="en-US" sz="2000" dirty="0" err="1" smtClean="0"/>
+              <a:t>clinique</a:t>
+            </a:r>
+            <a:r>
+              <a:rPr lang="en-US" sz="2000" dirty="0" smtClean="0"/>
+              <a:t>?</a:t>
+            </a:r>
+            <a:endParaRPr lang="en-US" sz="2000" dirty="0"/>
           </a:p>
         </p:txBody>
       </p:sp>
@@ -5159,7 +5186,7 @@
           <p:cNvPr id="4" name="Picture 5">
             <a:extLst>
               <a:ext uri="{FF2B5EF4-FFF2-40B4-BE49-F238E27FC236}">
-                <a16:creationId xmlns:a16="http://schemas.microsoft.com/office/drawing/2014/main" xmlns="" id="{B5A5B3E5-14C4-48CA-8609-9241986E0C6D}"/>
+                <a16:creationId xmlns="" xmlns:a16="http://schemas.microsoft.com/office/drawing/2014/main" id="{B5A5B3E5-14C4-48CA-8609-9241986E0C6D}"/>
               </a:ext>
             </a:extLst>
           </p:cNvPr>
@@ -5177,7 +5204,7 @@
         </p:blipFill>
         <p:spPr>
           <a:xfrm>
-            <a:off x="7229474" y="1658938"/>
+            <a:off x="7443786" y="2487613"/>
             <a:ext cx="4548188" cy="3648135"/>
           </a:xfrm>
           <a:prstGeom prst="rect">
@@ -5231,7 +5258,7 @@
           <p:cNvPr id="2" name="Title 1">
             <a:extLst>
               <a:ext uri="{FF2B5EF4-FFF2-40B4-BE49-F238E27FC236}">
-                <a16:creationId xmlns:a16="http://schemas.microsoft.com/office/drawing/2014/main" xmlns="" id="{9D31916C-EB41-4547-B4B1-8A73ECBFD18E}"/>
+                <a16:creationId xmlns="" xmlns:a16="http://schemas.microsoft.com/office/drawing/2014/main" id="{9D31916C-EB41-4547-B4B1-8A73ECBFD18E}"/>
               </a:ext>
             </a:extLst>
           </p:cNvPr>
@@ -5244,7 +5271,7 @@
         </p:nvSpPr>
         <p:spPr>
           <a:xfrm>
-            <a:off x="428625" y="428625"/>
+            <a:off x="428625" y="442912"/>
             <a:ext cx="11763375" cy="1425575"/>
           </a:xfrm>
           <a:prstGeom prst="rect">
@@ -5283,7 +5310,7 @@
           <p:cNvPr id="3" name="Content Placeholder 2">
             <a:extLst>
               <a:ext uri="{FF2B5EF4-FFF2-40B4-BE49-F238E27FC236}">
-                <a16:creationId xmlns:a16="http://schemas.microsoft.com/office/drawing/2014/main" xmlns="" id="{27C5A7BF-CBE4-431D-83B3-2829D4333BC5}"/>
+                <a16:creationId xmlns="" xmlns:a16="http://schemas.microsoft.com/office/drawing/2014/main" id="{27C5A7BF-CBE4-431D-83B3-2829D4333BC5}"/>
               </a:ext>
             </a:extLst>
           </p:cNvPr>
@@ -5296,7 +5323,7 @@
         </p:nvSpPr>
         <p:spPr>
           <a:xfrm>
-            <a:off x="0" y="1854200"/>
+            <a:off x="1128713" y="1682750"/>
             <a:ext cx="5884863" cy="3536950"/>
           </a:xfrm>
           <a:prstGeom prst="rect">
@@ -5318,31 +5345,39 @@
               <a:buChar char="Ø"/>
             </a:pPr>
             <a:r>
-              <a:rPr lang="fr-CA" dirty="0" smtClean="0"/>
+              <a:rPr lang="fr-CA" sz="2400" dirty="0" smtClean="0"/>
               <a:t>Planifications</a:t>
             </a:r>
             <a:r>
-              <a:rPr lang="en-US" dirty="0" smtClean="0"/>
-              <a:t> des taches</a:t>
-            </a:r>
-            <a:endParaRPr lang="en-US" dirty="0"/>
+              <a:rPr lang="en-US" sz="2400" dirty="0" smtClean="0"/>
+              <a:t> des </a:t>
+            </a:r>
+            <a:r>
+              <a:rPr lang="en-US" sz="2400" dirty="0" smtClean="0"/>
+              <a:t>taches</a:t>
+            </a:r>
+            <a:endParaRPr lang="en-US" sz="2400" dirty="0" smtClean="0"/>
           </a:p>
           <a:p>
             <a:pPr marL="342900" lvl="0" indent="-342900">
               <a:buFont typeface="Wingdings" pitchFamily="34"/>
               <a:buChar char="Ø"/>
             </a:pPr>
-            <a:endParaRPr lang="en-US" dirty="0" smtClean="0"/>
+            <a:r>
+              <a:rPr lang="en-US" sz="2400" dirty="0" err="1" smtClean="0"/>
+              <a:t>Organisation</a:t>
+            </a:r>
+            <a:r>
+              <a:rPr lang="en-US" sz="2400" dirty="0" smtClean="0"/>
+              <a:t> du travail</a:t>
+            </a:r>
           </a:p>
           <a:p>
             <a:pPr marL="342900" lvl="0" indent="-342900">
               <a:buFont typeface="Wingdings" pitchFamily="34"/>
               <a:buChar char="Ø"/>
             </a:pPr>
-            <a:r>
-              <a:rPr lang="en-US" dirty="0"/>
-              <a:t> </a:t>
-            </a:r>
+            <a:endParaRPr lang="fr-CA" dirty="0"/>
           </a:p>
         </p:txBody>
       </p:sp>
@@ -5436,33 +5471,49 @@
           </a:p>
           <a:p>
             <a:r>
+              <a:rPr lang="fr-CA" dirty="0" smtClean="0"/>
+              <a:t>Clients</a:t>
+            </a:r>
+            <a:endParaRPr lang="fr-CA" dirty="0" smtClean="0"/>
+          </a:p>
+          <a:p>
+            <a:r>
+              <a:rPr lang="fr-CA" dirty="0" smtClean="0"/>
+              <a:t>Efficacité </a:t>
+            </a:r>
+            <a:endParaRPr lang="fr-CA" dirty="0" smtClean="0"/>
+          </a:p>
+          <a:p>
+            <a:r>
+              <a:rPr lang="fr-CA" dirty="0" smtClean="0"/>
+              <a:t>Utilisabilité</a:t>
+            </a:r>
+            <a:endParaRPr lang="fr-CA" dirty="0" smtClean="0"/>
+          </a:p>
+          <a:p>
+            <a:r>
+              <a:rPr lang="fr-CA" dirty="0" smtClean="0"/>
+              <a:t>Sécurité </a:t>
+            </a:r>
+          </a:p>
+          <a:p>
+            <a:r>
               <a:rPr lang="fr-CA" dirty="0" err="1" smtClean="0"/>
-              <a:t>Efficicaite</a:t>
+              <a:t>Qualite</a:t>
             </a:r>
             <a:r>
               <a:rPr lang="fr-CA" dirty="0" smtClean="0"/>
+              <a:t> du logiciel????</a:t>
+            </a:r>
+            <a:r>
+              <a:rPr lang="en-US" dirty="0"/>
               <a:t> </a:t>
             </a:r>
-          </a:p>
-          <a:p>
-            <a:r>
-              <a:rPr lang="fr-CA" dirty="0" err="1" smtClean="0"/>
-              <a:t>Utilisabilite</a:t>
+            <a:r>
+              <a:rPr lang="en-US" dirty="0" smtClean="0"/>
+              <a:t>// new slide or ?</a:t>
             </a:r>
             <a:endParaRPr lang="fr-CA" dirty="0" smtClean="0"/>
-          </a:p>
-          <a:p>
-            <a:r>
-              <a:rPr lang="fr-CA" dirty="0" err="1" smtClean="0"/>
-              <a:t>Securite</a:t>
-            </a:r>
-            <a:r>
-              <a:rPr lang="fr-CA" dirty="0" smtClean="0"/>
-              <a:t> </a:t>
-            </a:r>
-          </a:p>
-          <a:p>
-            <a:endParaRPr lang="en-US" dirty="0"/>
           </a:p>
         </p:txBody>
       </p:sp>
@@ -5541,29 +5592,31 @@
             <p:ph idx="1"/>
           </p:nvPr>
         </p:nvSpPr>
-        <p:spPr/>
-        <p:txBody>
-          <a:bodyPr/>
+        <p:spPr>
+          <a:xfrm>
+            <a:off x="580042" y="2044307"/>
+            <a:ext cx="9603275" cy="3450613"/>
+          </a:xfrm>
+          <a:noFill/>
+        </p:spPr>
+        <p:txBody>
+          <a:bodyPr>
+            <a:normAutofit/>
+          </a:bodyPr>
           <a:lstStyle/>
           <a:p>
-            <a:pPr marL="0" marR="0" lvl="0" indent="0" defTabSz="914400" eaLnBrk="1" fontAlgn="auto" latinLnBrk="0" hangingPunct="1">
-              <a:lnSpc>
-                <a:spcPct val="100000"/>
-              </a:lnSpc>
-              <a:spcBef>
-                <a:spcPts val="0"/>
-              </a:spcBef>
-              <a:spcAft>
-                <a:spcPts val="0"/>
-              </a:spcAft>
-              <a:buClrTx/>
-              <a:buSzTx/>
-              <a:buFontTx/>
-              <a:buNone/>
-              <a:tabLst/>
-              <a:defRPr/>
+            <a:pPr marL="342900" indent="-342900">
+              <a:buFont typeface="Wingdings" pitchFamily="34"/>
+              <a:buChar char="Ø"/>
             </a:pPr>
-            <a:endParaRPr lang="en-US" dirty="0"/>
+            <a:r>
+              <a:rPr lang="fr-CA" sz="2800" dirty="0" smtClean="0"/>
+              <a:t>Leçons</a:t>
+            </a:r>
+            <a:r>
+              <a:rPr lang="en-US" sz="2800" dirty="0" smtClean="0"/>
+              <a:t> apprises</a:t>
+            </a:r>
           </a:p>
         </p:txBody>
       </p:sp>
@@ -5609,7 +5662,7 @@
           <p:cNvPr id="3" name="Straight Connector 11">
             <a:extLst>
               <a:ext uri="{FF2B5EF4-FFF2-40B4-BE49-F238E27FC236}">
-                <a16:creationId xmlns:a16="http://schemas.microsoft.com/office/drawing/2014/main" xmlns="" id="{F9401581-7AB4-425B-9BC3-DB81FBD10012}"/>
+                <a16:creationId xmlns="" xmlns:a16="http://schemas.microsoft.com/office/drawing/2014/main" id="{F9401581-7AB4-425B-9BC3-DB81FBD10012}"/>
               </a:ext>
             </a:extLst>
           </p:cNvPr>
@@ -5640,7 +5693,7 @@
           <p:cNvPr id="5" name="Rectangle 13">
             <a:extLst>
               <a:ext uri="{FF2B5EF4-FFF2-40B4-BE49-F238E27FC236}">
-                <a16:creationId xmlns:a16="http://schemas.microsoft.com/office/drawing/2014/main" xmlns="" id="{3FD82B9E-7E33-479D-A5EC-878B639FF122}"/>
+                <a16:creationId xmlns="" xmlns:a16="http://schemas.microsoft.com/office/drawing/2014/main" id="{3FD82B9E-7E33-479D-A5EC-878B639FF122}"/>
               </a:ext>
             </a:extLst>
           </p:cNvPr>
@@ -5704,7 +5757,7 @@
           <p:cNvPr id="6" name="TextBox 3">
             <a:extLst>
               <a:ext uri="{FF2B5EF4-FFF2-40B4-BE49-F238E27FC236}">
-                <a16:creationId xmlns:a16="http://schemas.microsoft.com/office/drawing/2014/main" xmlns="" id="{E25F79C7-92C6-439F-8486-353EE46C207D}"/>
+                <a16:creationId xmlns="" xmlns:a16="http://schemas.microsoft.com/office/drawing/2014/main" id="{E25F79C7-92C6-439F-8486-353EE46C207D}"/>
               </a:ext>
             </a:extLst>
           </p:cNvPr>
@@ -5769,7 +5822,7 @@
           <p:cNvPr id="11" name="Picture 19">
             <a:extLst>
               <a:ext uri="{FF2B5EF4-FFF2-40B4-BE49-F238E27FC236}">
-                <a16:creationId xmlns:a16="http://schemas.microsoft.com/office/drawing/2014/main" xmlns="" id="{62B382B9-292E-47BE-9C4B-FCA10CD29B82}"/>
+                <a16:creationId xmlns="" xmlns:a16="http://schemas.microsoft.com/office/drawing/2014/main" id="{62B382B9-292E-47BE-9C4B-FCA10CD29B82}"/>
               </a:ext>
             </a:extLst>
           </p:cNvPr>
@@ -5804,7 +5857,7 @@
           <p:cNvPr id="12" name="Straight Connector 21">
             <a:extLst>
               <a:ext uri="{FF2B5EF4-FFF2-40B4-BE49-F238E27FC236}">
-                <a16:creationId xmlns:a16="http://schemas.microsoft.com/office/drawing/2014/main" xmlns="" id="{3EAC13E9-E12C-4916-A060-953E50C0B8B6}"/>
+                <a16:creationId xmlns="" xmlns:a16="http://schemas.microsoft.com/office/drawing/2014/main" id="{3EAC13E9-E12C-4916-A060-953E50C0B8B6}"/>
               </a:ext>
             </a:extLst>
           </p:cNvPr>
@@ -5837,7 +5890,7 @@
           <p:cNvPr id="13" name="TextBox 8">
             <a:extLst>
               <a:ext uri="{FF2B5EF4-FFF2-40B4-BE49-F238E27FC236}">
-                <a16:creationId xmlns:a16="http://schemas.microsoft.com/office/drawing/2014/main" xmlns="" id="{3647030B-605A-4AD0-AEDA-34BDD2CF6269}"/>
+                <a16:creationId xmlns="" xmlns:a16="http://schemas.microsoft.com/office/drawing/2014/main" id="{3647030B-605A-4AD0-AEDA-34BDD2CF6269}"/>
               </a:ext>
             </a:extLst>
           </p:cNvPr>

</xml_diff>